<commit_message>
Minor revisions to PPTs
</commit_message>
<xml_diff>
--- a/Intro.pptx
+++ b/Intro.pptx
@@ -197,7 +197,7 @@
           <a:p>
             <a:fld id="{B3E85FA4-0BF1-4624-B558-8D6F7C4705DF}" type="datetimeFigureOut">
               <a:rPr lang="en-US" smtClean="0"/>
-              <a:t>9/25/2012</a:t>
+              <a:t>5/8/2013</a:t>
             </a:fld>
             <a:endParaRPr lang="en-US"/>
           </a:p>
@@ -784,7 +784,11 @@
             </a:r>
             <a:r>
               <a:rPr lang="en-US" baseline="0" dirty="0" smtClean="0"/>
-              <a:t> Target: Versions</a:t>
+              <a:t> Target: </a:t>
+            </a:r>
+            <a:r>
+              <a:rPr lang="en-US" baseline="0" dirty="0" smtClean="0"/>
+              <a:t>Versions (see below notes from Google)</a:t>
             </a:r>
           </a:p>
           <a:p>
@@ -807,8 +811,13 @@
             </a:pPr>
             <a:r>
               <a:rPr lang="en-US" baseline="0" dirty="0" smtClean="0"/>
-              <a:t>8/22/2012 e-mail:</a:t>
-            </a:r>
+              <a:t>As long as you’re doing basic stuff, you won’t have to worry too much about the versions, but you’ll want to subscribe to the Google Geo Developers Blog so you’ll know </a:t>
+            </a:r>
+            <a:r>
+              <a:rPr lang="en-US" baseline="0" smtClean="0"/>
+              <a:t>about releases.</a:t>
+            </a:r>
+            <a:endParaRPr lang="en-US" baseline="0" dirty="0" smtClean="0"/>
           </a:p>
           <a:p>
             <a:pPr marL="0" marR="0" indent="0" algn="l" defTabSz="914400" rtl="0" eaLnBrk="1" fontAlgn="auto" latinLnBrk="0" hangingPunct="1">
@@ -838,7 +847,7 @@
                 <a:ea typeface="+mn-ea"/>
                 <a:cs typeface="+mn-cs"/>
               </a:rPr>
-              <a:t>We recently released a new minor version of the Google Maps API. This</a:t>
+              <a:t/>
             </a:r>
             <a:br>
               <a:rPr lang="en-US" sz="1200" kern="1200" dirty="0" smtClean="0">
@@ -861,7 +870,7 @@
                 <a:ea typeface="+mn-ea"/>
                 <a:cs typeface="+mn-cs"/>
               </a:rPr>
-              <a:t>means that the versions are now:</a:t>
+              <a:t>*Changes to versioning*</a:t>
             </a:r>
             <a:br>
               <a:rPr lang="en-US" sz="1200" kern="1200" dirty="0" smtClean="0">
@@ -884,7 +893,7 @@
                 <a:ea typeface="+mn-ea"/>
                 <a:cs typeface="+mn-cs"/>
               </a:rPr>
-              <a:t>3.10: Experimental</a:t>
+              <a:t>Previously, if you requested the API without the v parameter, or using v=3,</a:t>
             </a:r>
             <a:br>
               <a:rPr lang="en-US" sz="1200" kern="1200" dirty="0" smtClean="0">
@@ -907,9 +916,9 @@
                 <a:ea typeface="+mn-ea"/>
                 <a:cs typeface="+mn-cs"/>
               </a:rPr>
-              <a:t>3.9: Release</a:t>
-            </a:r>
-            <a:br>
+              <a:t>you would receive the experimental version. </a:t>
+            </a:r>
+            <a:r>
               <a:rPr lang="en-US" sz="1200" kern="1200" dirty="0" smtClean="0">
                 <a:solidFill>
                   <a:schemeClr val="tx1"/>
@@ -919,7 +928,8 @@
                 <a:ea typeface="+mn-ea"/>
                 <a:cs typeface="+mn-cs"/>
               </a:rPr>
-            </a:br>
+              <a:t>Nowadays you will</a:t>
+            </a:r>
             <a:r>
               <a:rPr lang="en-US" sz="1200" kern="1200" dirty="0" smtClean="0">
                 <a:solidFill>
@@ -930,145 +940,7 @@
                 <a:ea typeface="+mn-ea"/>
                 <a:cs typeface="+mn-cs"/>
               </a:rPr>
-              <a:t>3.8: Frozen</a:t>
-            </a:r>
-            <a:br>
-              <a:rPr lang="en-US" sz="1200" kern="1200" dirty="0" smtClean="0">
-                <a:solidFill>
-                  <a:schemeClr val="tx1"/>
-                </a:solidFill>
-                <a:effectLst/>
-                <a:latin typeface="+mn-lt"/>
-                <a:ea typeface="+mn-ea"/>
-                <a:cs typeface="+mn-cs"/>
-              </a:rPr>
-            </a:br>
-            <a:r>
-              <a:rPr lang="en-US" sz="1200" kern="1200" dirty="0" smtClean="0">
-                <a:solidFill>
-                  <a:schemeClr val="tx1"/>
-                </a:solidFill>
-                <a:effectLst/>
-                <a:latin typeface="+mn-lt"/>
-                <a:ea typeface="+mn-ea"/>
-                <a:cs typeface="+mn-cs"/>
-              </a:rPr>
-              <a:t> </a:t>
-            </a:r>
-            <a:br>
-              <a:rPr lang="en-US" sz="1200" kern="1200" dirty="0" smtClean="0">
-                <a:solidFill>
-                  <a:schemeClr val="tx1"/>
-                </a:solidFill>
-                <a:effectLst/>
-                <a:latin typeface="+mn-lt"/>
-                <a:ea typeface="+mn-ea"/>
-                <a:cs typeface="+mn-cs"/>
-              </a:rPr>
-            </a:br>
-            <a:r>
-              <a:rPr lang="en-US" sz="1200" kern="1200" dirty="0" smtClean="0">
-                <a:solidFill>
-                  <a:schemeClr val="tx1"/>
-                </a:solidFill>
-                <a:effectLst/>
-                <a:latin typeface="+mn-lt"/>
-                <a:ea typeface="+mn-ea"/>
-                <a:cs typeface="+mn-cs"/>
-              </a:rPr>
-              <a:t>3.7 has been removed: if you request it you will receive 3.8.</a:t>
-            </a:r>
-            <a:br>
-              <a:rPr lang="en-US" sz="1200" kern="1200" dirty="0" smtClean="0">
-                <a:solidFill>
-                  <a:schemeClr val="tx1"/>
-                </a:solidFill>
-                <a:effectLst/>
-                <a:latin typeface="+mn-lt"/>
-                <a:ea typeface="+mn-ea"/>
-                <a:cs typeface="+mn-cs"/>
-              </a:rPr>
-            </a:br>
-            <a:r>
-              <a:rPr lang="en-US" sz="1200" kern="1200" dirty="0" smtClean="0">
-                <a:solidFill>
-                  <a:schemeClr val="tx1"/>
-                </a:solidFill>
-                <a:effectLst/>
-                <a:latin typeface="+mn-lt"/>
-                <a:ea typeface="+mn-ea"/>
-                <a:cs typeface="+mn-cs"/>
-              </a:rPr>
-              <a:t> </a:t>
-            </a:r>
-            <a:br>
-              <a:rPr lang="en-US" sz="1200" kern="1200" dirty="0" smtClean="0">
-                <a:solidFill>
-                  <a:schemeClr val="tx1"/>
-                </a:solidFill>
-                <a:effectLst/>
-                <a:latin typeface="+mn-lt"/>
-                <a:ea typeface="+mn-ea"/>
-                <a:cs typeface="+mn-cs"/>
-              </a:rPr>
-            </a:br>
-            <a:r>
-              <a:rPr lang="en-US" sz="1200" kern="1200" dirty="0" smtClean="0">
-                <a:solidFill>
-                  <a:schemeClr val="tx1"/>
-                </a:solidFill>
-                <a:effectLst/>
-                <a:latin typeface="+mn-lt"/>
-                <a:ea typeface="+mn-ea"/>
-                <a:cs typeface="+mn-cs"/>
-              </a:rPr>
-              <a:t>*Changes to versioning*</a:t>
-            </a:r>
-            <a:br>
-              <a:rPr lang="en-US" sz="1200" kern="1200" dirty="0" smtClean="0">
-                <a:solidFill>
-                  <a:schemeClr val="tx1"/>
-                </a:solidFill>
-                <a:effectLst/>
-                <a:latin typeface="+mn-lt"/>
-                <a:ea typeface="+mn-ea"/>
-                <a:cs typeface="+mn-cs"/>
-              </a:rPr>
-            </a:br>
-            <a:r>
-              <a:rPr lang="en-US" sz="1200" kern="1200" dirty="0" smtClean="0">
-                <a:solidFill>
-                  <a:schemeClr val="tx1"/>
-                </a:solidFill>
-                <a:effectLst/>
-                <a:latin typeface="+mn-lt"/>
-                <a:ea typeface="+mn-ea"/>
-                <a:cs typeface="+mn-cs"/>
-              </a:rPr>
-              <a:t>Previously, if you requested the API without the v parameter, or using v=3,</a:t>
-            </a:r>
-            <a:br>
-              <a:rPr lang="en-US" sz="1200" kern="1200" dirty="0" smtClean="0">
-                <a:solidFill>
-                  <a:schemeClr val="tx1"/>
-                </a:solidFill>
-                <a:effectLst/>
-                <a:latin typeface="+mn-lt"/>
-                <a:ea typeface="+mn-ea"/>
-                <a:cs typeface="+mn-cs"/>
-              </a:rPr>
-            </a:br>
-            <a:r>
-              <a:rPr lang="en-US" sz="1200" kern="1200" dirty="0" smtClean="0">
-                <a:solidFill>
-                  <a:schemeClr val="tx1"/>
-                </a:solidFill>
-                <a:effectLst/>
-                <a:latin typeface="+mn-lt"/>
-                <a:ea typeface="+mn-ea"/>
-                <a:cs typeface="+mn-cs"/>
-              </a:rPr>
-              <a:t>you would receive the experimental version. From today, you will now</a:t>
+              <a:t/>
             </a:r>
             <a:br>
               <a:rPr lang="en-US" sz="1200" kern="1200" dirty="0" smtClean="0">
@@ -2089,7 +1961,7 @@
           <a:p>
             <a:fld id="{0E2A55ED-DD07-4463-BF52-CBAFC7E1266F}" type="datetimeFigureOut">
               <a:rPr lang="en-US" smtClean="0"/>
-              <a:t>9/25/2012</a:t>
+              <a:t>5/8/2013</a:t>
             </a:fld>
             <a:endParaRPr lang="en-US"/>
           </a:p>
@@ -2261,7 +2133,7 @@
           <a:p>
             <a:fld id="{0E2A55ED-DD07-4463-BF52-CBAFC7E1266F}" type="datetimeFigureOut">
               <a:rPr lang="en-US" smtClean="0"/>
-              <a:t>9/25/2012</a:t>
+              <a:t>5/8/2013</a:t>
             </a:fld>
             <a:endParaRPr lang="en-US"/>
           </a:p>
@@ -2443,7 +2315,7 @@
           <a:p>
             <a:fld id="{0E2A55ED-DD07-4463-BF52-CBAFC7E1266F}" type="datetimeFigureOut">
               <a:rPr lang="en-US" smtClean="0"/>
-              <a:t>9/25/2012</a:t>
+              <a:t>5/8/2013</a:t>
             </a:fld>
             <a:endParaRPr lang="en-US"/>
           </a:p>
@@ -2615,7 +2487,7 @@
           <a:p>
             <a:fld id="{0E2A55ED-DD07-4463-BF52-CBAFC7E1266F}" type="datetimeFigureOut">
               <a:rPr lang="en-US" smtClean="0"/>
-              <a:t>9/25/2012</a:t>
+              <a:t>5/8/2013</a:t>
             </a:fld>
             <a:endParaRPr lang="en-US"/>
           </a:p>
@@ -2739,7 +2611,7 @@
           <a:p>
             <a:fld id="{0E2A55ED-DD07-4463-BF52-CBAFC7E1266F}" type="datetimeFigureOut">
               <a:rPr lang="en-US" smtClean="0"/>
-              <a:t>9/25/2012</a:t>
+              <a:t>5/8/2013</a:t>
             </a:fld>
             <a:endParaRPr lang="en-US"/>
           </a:p>
@@ -3018,7 +2890,7 @@
           <a:p>
             <a:fld id="{0E2A55ED-DD07-4463-BF52-CBAFC7E1266F}" type="datetimeFigureOut">
               <a:rPr lang="en-US" smtClean="0"/>
-              <a:t>9/25/2012</a:t>
+              <a:t>5/8/2013</a:t>
             </a:fld>
             <a:endParaRPr lang="en-US"/>
           </a:p>
@@ -3287,7 +3159,7 @@
           <a:p>
             <a:fld id="{0E2A55ED-DD07-4463-BF52-CBAFC7E1266F}" type="datetimeFigureOut">
               <a:rPr lang="en-US" smtClean="0"/>
-              <a:t>9/25/2012</a:t>
+              <a:t>5/8/2013</a:t>
             </a:fld>
             <a:endParaRPr lang="en-US"/>
           </a:p>
@@ -3741,7 +3613,7 @@
           <a:p>
             <a:fld id="{0E2A55ED-DD07-4463-BF52-CBAFC7E1266F}" type="datetimeFigureOut">
               <a:rPr lang="en-US" smtClean="0"/>
-              <a:t>9/25/2012</a:t>
+              <a:t>5/8/2013</a:t>
             </a:fld>
             <a:endParaRPr lang="en-US"/>
           </a:p>
@@ -3861,7 +3733,7 @@
           <a:p>
             <a:fld id="{0E2A55ED-DD07-4463-BF52-CBAFC7E1266F}" type="datetimeFigureOut">
               <a:rPr lang="en-US" smtClean="0"/>
-              <a:t>9/25/2012</a:t>
+              <a:t>5/8/2013</a:t>
             </a:fld>
             <a:endParaRPr lang="en-US"/>
           </a:p>
@@ -4118,7 +3990,7 @@
           <a:p>
             <a:fld id="{0E2A55ED-DD07-4463-BF52-CBAFC7E1266F}" type="datetimeFigureOut">
               <a:rPr lang="en-US" smtClean="0"/>
-              <a:t>9/25/2012</a:t>
+              <a:t>5/8/2013</a:t>
             </a:fld>
             <a:endParaRPr lang="en-US"/>
           </a:p>
@@ -4365,7 +4237,7 @@
           <a:p>
             <a:fld id="{0E2A55ED-DD07-4463-BF52-CBAFC7E1266F}" type="datetimeFigureOut">
               <a:rPr lang="en-US" smtClean="0"/>
-              <a:t>9/25/2012</a:t>
+              <a:t>5/8/2013</a:t>
             </a:fld>
             <a:endParaRPr lang="en-US"/>
           </a:p>
@@ -4545,7 +4417,7 @@
           <a:p>
             <a:fld id="{0E2A55ED-DD07-4463-BF52-CBAFC7E1266F}" type="datetimeFigureOut">
               <a:rPr lang="en-US" smtClean="0"/>
-              <a:t>9/25/2012</a:t>
+              <a:t>5/8/2013</a:t>
             </a:fld>
             <a:endParaRPr lang="en-US"/>
           </a:p>
@@ -5053,13 +4925,8 @@
           <a:p>
             <a:r>
               <a:rPr lang="en-US" dirty="0" smtClean="0"/>
-              <a:t>Mike Dolbow, </a:t>
-            </a:r>
-            <a:r>
-              <a:rPr lang="en-US" dirty="0" smtClean="0"/>
-              <a:t>Applications Unit Supervisor</a:t>
-            </a:r>
-            <a:endParaRPr lang="en-US" dirty="0" smtClean="0"/>
+              <a:t>Mike Dolbow, Applications Unit Supervisor</a:t>
+            </a:r>
           </a:p>
           <a:p>
             <a:r>

</xml_diff>

<commit_message>
Minor updates, checked links
</commit_message>
<xml_diff>
--- a/Intro.pptx
+++ b/Intro.pptx
@@ -197,7 +197,7 @@
           <a:p>
             <a:fld id="{B3E85FA4-0BF1-4624-B558-8D6F7C4705DF}" type="datetimeFigureOut">
               <a:rPr lang="en-US" smtClean="0"/>
-              <a:t>5/8/2013</a:t>
+              <a:t>5/15/2013</a:t>
             </a:fld>
             <a:endParaRPr lang="en-US"/>
           </a:p>
@@ -757,7 +757,15 @@
             </a:pPr>
             <a:r>
               <a:rPr lang="en-US" dirty="0" smtClean="0"/>
-              <a:t>You might have to deal with ads</a:t>
+              <a:t>You might have to deal with </a:t>
+            </a:r>
+            <a:r>
+              <a:rPr lang="en-US" dirty="0" smtClean="0"/>
+              <a:t>ads, although I haven’t seen</a:t>
+            </a:r>
+            <a:r>
+              <a:rPr lang="en-US" baseline="0" dirty="0" smtClean="0"/>
+              <a:t> any yet</a:t>
             </a:r>
           </a:p>
           <a:p>
@@ -779,17 +787,10 @@
               <a:defRPr/>
             </a:pPr>
             <a:r>
-              <a:rPr lang="en-US" dirty="0" smtClean="0"/>
-              <a:t>Moving</a:t>
-            </a:r>
-            <a:r>
               <a:rPr lang="en-US" baseline="0" dirty="0" smtClean="0"/>
-              <a:t> Target: </a:t>
-            </a:r>
-            <a:r>
-              <a:rPr lang="en-US" baseline="0" dirty="0" smtClean="0"/>
-              <a:t>Versions (see below notes from Google)</a:t>
-            </a:r>
+              <a:t>In v2 you needed an API key. In v3 at first you didn’t, and now you do. But you don’t need one to develop, only to deploy.</a:t>
+            </a:r>
+            <a:endParaRPr lang="en-US" dirty="0" smtClean="0"/>
           </a:p>
           <a:p>
             <a:pPr marL="0" marR="0" indent="0" algn="l" defTabSz="914400" rtl="0" eaLnBrk="1" fontAlgn="auto" latinLnBrk="0" hangingPunct="1">
@@ -810,14 +811,13 @@
               <a:defRPr/>
             </a:pPr>
             <a:r>
+              <a:rPr lang="en-US" dirty="0" smtClean="0"/>
+              <a:t>Moving</a:t>
+            </a:r>
+            <a:r>
               <a:rPr lang="en-US" baseline="0" dirty="0" smtClean="0"/>
-              <a:t>As long as you’re doing basic stuff, you won’t have to worry too much about the versions, but you’ll want to subscribe to the Google Geo Developers Blog so you’ll know </a:t>
-            </a:r>
-            <a:r>
-              <a:rPr lang="en-US" baseline="0" smtClean="0"/>
-              <a:t>about releases.</a:t>
-            </a:r>
-            <a:endParaRPr lang="en-US" baseline="0" dirty="0" smtClean="0"/>
+              <a:t> Target: Versions (see below notes from Google)</a:t>
+            </a:r>
           </a:p>
           <a:p>
             <a:pPr marL="0" marR="0" indent="0" algn="l" defTabSz="914400" rtl="0" eaLnBrk="1" fontAlgn="auto" latinLnBrk="0" hangingPunct="1">
@@ -838,6 +838,61 @@
               <a:defRPr/>
             </a:pPr>
             <a:r>
+              <a:rPr lang="en-US" baseline="0" dirty="0" smtClean="0"/>
+              <a:t>As long as you’re doing basic stuff, you won’t have to worry too much about the versions, but you’ll want to subscribe to the Google Geo Developers Blog so you’ll know about releases</a:t>
+            </a:r>
+            <a:r>
+              <a:rPr lang="en-US" baseline="0" dirty="0" smtClean="0"/>
+              <a:t>.</a:t>
+            </a:r>
+          </a:p>
+          <a:p>
+            <a:pPr marL="0" marR="0" indent="0" algn="l" defTabSz="914400" rtl="0" eaLnBrk="1" fontAlgn="auto" latinLnBrk="0" hangingPunct="1">
+              <a:lnSpc>
+                <a:spcPct val="100000"/>
+              </a:lnSpc>
+              <a:spcBef>
+                <a:spcPts val="0"/>
+              </a:spcBef>
+              <a:spcAft>
+                <a:spcPts val="0"/>
+              </a:spcAft>
+              <a:buClrTx/>
+              <a:buSzTx/>
+              <a:buFontTx/>
+              <a:buNone/>
+              <a:tabLst/>
+              <a:defRPr/>
+            </a:pPr>
+            <a:r>
+              <a:rPr lang="en-US" baseline="0" dirty="0" smtClean="0"/>
+              <a:t>They reserve the right to serve you up different tiles than they serve on their site. Right now (5/2013), it’s pretty consistent – but </a:t>
+            </a:r>
+            <a:r>
+              <a:rPr lang="en-US" baseline="0" smtClean="0"/>
+              <a:t>it doesn’t have to be.</a:t>
+            </a:r>
+            <a:endParaRPr lang="en-US" baseline="0" dirty="0" smtClean="0"/>
+          </a:p>
+          <a:p>
+            <a:pPr marL="0" marR="0" indent="0" algn="l" defTabSz="914400" rtl="0" eaLnBrk="1" fontAlgn="auto" latinLnBrk="0" hangingPunct="1">
+              <a:lnSpc>
+                <a:spcPct val="100000"/>
+              </a:lnSpc>
+              <a:spcBef>
+                <a:spcPts val="0"/>
+              </a:spcBef>
+              <a:spcAft>
+                <a:spcPts val="0"/>
+              </a:spcAft>
+              <a:buClrTx/>
+              <a:buSzTx/>
+              <a:buFontTx/>
+              <a:buNone/>
+              <a:tabLst/>
+              <a:defRPr/>
+            </a:pPr>
+            <a:r>
               <a:rPr lang="en-US" sz="1200" kern="1200" dirty="0" smtClean="0">
                 <a:solidFill>
                   <a:schemeClr val="tx1"/>
@@ -916,31 +971,7 @@
                 <a:ea typeface="+mn-ea"/>
                 <a:cs typeface="+mn-cs"/>
               </a:rPr>
-              <a:t>you would receive the experimental version. </a:t>
-            </a:r>
-            <a:r>
-              <a:rPr lang="en-US" sz="1200" kern="1200" dirty="0" smtClean="0">
-                <a:solidFill>
-                  <a:schemeClr val="tx1"/>
-                </a:solidFill>
-                <a:effectLst/>
-                <a:latin typeface="+mn-lt"/>
-                <a:ea typeface="+mn-ea"/>
-                <a:cs typeface="+mn-cs"/>
-              </a:rPr>
-              <a:t>Nowadays you will</a:t>
-            </a:r>
-            <a:r>
-              <a:rPr lang="en-US" sz="1200" kern="1200" dirty="0" smtClean="0">
-                <a:solidFill>
-                  <a:schemeClr val="tx1"/>
-                </a:solidFill>
-                <a:effectLst/>
-                <a:latin typeface="+mn-lt"/>
-                <a:ea typeface="+mn-ea"/>
-                <a:cs typeface="+mn-cs"/>
-              </a:rPr>
-              <a:t/>
+              <a:t>you would receive the experimental version. Nowadays you will</a:t>
             </a:r>
             <a:br>
               <a:rPr lang="en-US" sz="1200" kern="1200" dirty="0" smtClean="0">
@@ -1961,7 +1992,7 @@
           <a:p>
             <a:fld id="{0E2A55ED-DD07-4463-BF52-CBAFC7E1266F}" type="datetimeFigureOut">
               <a:rPr lang="en-US" smtClean="0"/>
-              <a:t>5/8/2013</a:t>
+              <a:t>5/15/2013</a:t>
             </a:fld>
             <a:endParaRPr lang="en-US"/>
           </a:p>
@@ -2133,7 +2164,7 @@
           <a:p>
             <a:fld id="{0E2A55ED-DD07-4463-BF52-CBAFC7E1266F}" type="datetimeFigureOut">
               <a:rPr lang="en-US" smtClean="0"/>
-              <a:t>5/8/2013</a:t>
+              <a:t>5/15/2013</a:t>
             </a:fld>
             <a:endParaRPr lang="en-US"/>
           </a:p>
@@ -2315,7 +2346,7 @@
           <a:p>
             <a:fld id="{0E2A55ED-DD07-4463-BF52-CBAFC7E1266F}" type="datetimeFigureOut">
               <a:rPr lang="en-US" smtClean="0"/>
-              <a:t>5/8/2013</a:t>
+              <a:t>5/15/2013</a:t>
             </a:fld>
             <a:endParaRPr lang="en-US"/>
           </a:p>
@@ -2487,7 +2518,7 @@
           <a:p>
             <a:fld id="{0E2A55ED-DD07-4463-BF52-CBAFC7E1266F}" type="datetimeFigureOut">
               <a:rPr lang="en-US" smtClean="0"/>
-              <a:t>5/8/2013</a:t>
+              <a:t>5/15/2013</a:t>
             </a:fld>
             <a:endParaRPr lang="en-US"/>
           </a:p>
@@ -2611,7 +2642,7 @@
           <a:p>
             <a:fld id="{0E2A55ED-DD07-4463-BF52-CBAFC7E1266F}" type="datetimeFigureOut">
               <a:rPr lang="en-US" smtClean="0"/>
-              <a:t>5/8/2013</a:t>
+              <a:t>5/15/2013</a:t>
             </a:fld>
             <a:endParaRPr lang="en-US"/>
           </a:p>
@@ -2890,7 +2921,7 @@
           <a:p>
             <a:fld id="{0E2A55ED-DD07-4463-BF52-CBAFC7E1266F}" type="datetimeFigureOut">
               <a:rPr lang="en-US" smtClean="0"/>
-              <a:t>5/8/2013</a:t>
+              <a:t>5/15/2013</a:t>
             </a:fld>
             <a:endParaRPr lang="en-US"/>
           </a:p>
@@ -3159,7 +3190,7 @@
           <a:p>
             <a:fld id="{0E2A55ED-DD07-4463-BF52-CBAFC7E1266F}" type="datetimeFigureOut">
               <a:rPr lang="en-US" smtClean="0"/>
-              <a:t>5/8/2013</a:t>
+              <a:t>5/15/2013</a:t>
             </a:fld>
             <a:endParaRPr lang="en-US"/>
           </a:p>
@@ -3613,7 +3644,7 @@
           <a:p>
             <a:fld id="{0E2A55ED-DD07-4463-BF52-CBAFC7E1266F}" type="datetimeFigureOut">
               <a:rPr lang="en-US" smtClean="0"/>
-              <a:t>5/8/2013</a:t>
+              <a:t>5/15/2013</a:t>
             </a:fld>
             <a:endParaRPr lang="en-US"/>
           </a:p>
@@ -3733,7 +3764,7 @@
           <a:p>
             <a:fld id="{0E2A55ED-DD07-4463-BF52-CBAFC7E1266F}" type="datetimeFigureOut">
               <a:rPr lang="en-US" smtClean="0"/>
-              <a:t>5/8/2013</a:t>
+              <a:t>5/15/2013</a:t>
             </a:fld>
             <a:endParaRPr lang="en-US"/>
           </a:p>
@@ -3990,7 +4021,7 @@
           <a:p>
             <a:fld id="{0E2A55ED-DD07-4463-BF52-CBAFC7E1266F}" type="datetimeFigureOut">
               <a:rPr lang="en-US" smtClean="0"/>
-              <a:t>5/8/2013</a:t>
+              <a:t>5/15/2013</a:t>
             </a:fld>
             <a:endParaRPr lang="en-US"/>
           </a:p>
@@ -4237,7 +4268,7 @@
           <a:p>
             <a:fld id="{0E2A55ED-DD07-4463-BF52-CBAFC7E1266F}" type="datetimeFigureOut">
               <a:rPr lang="en-US" smtClean="0"/>
-              <a:t>5/8/2013</a:t>
+              <a:t>5/15/2013</a:t>
             </a:fld>
             <a:endParaRPr lang="en-US"/>
           </a:p>
@@ -4417,7 +4448,7 @@
           <a:p>
             <a:fld id="{0E2A55ED-DD07-4463-BF52-CBAFC7E1266F}" type="datetimeFigureOut">
               <a:rPr lang="en-US" smtClean="0"/>
-              <a:t>5/8/2013</a:t>
+              <a:t>5/15/2013</a:t>
             </a:fld>
             <a:endParaRPr lang="en-US"/>
           </a:p>
@@ -5455,7 +5486,7 @@
         </p:spPr>
         <p:txBody>
           <a:bodyPr>
-            <a:normAutofit/>
+            <a:normAutofit fontScale="92500"/>
           </a:bodyPr>
           <a:lstStyle/>
           <a:p>
@@ -5467,7 +5498,27 @@
           <a:p>
             <a:r>
               <a:rPr lang="en-US" dirty="0" smtClean="0"/>
-              <a:t>The default API is a moving target</a:t>
+              <a:t>You need an </a:t>
+            </a:r>
+            <a:r>
+              <a:rPr lang="en-US" dirty="0" smtClean="0">
+                <a:hlinkClick r:id="rId3"/>
+              </a:rPr>
+              <a:t>API key</a:t>
+            </a:r>
+            <a:r>
+              <a:rPr lang="en-US" dirty="0" smtClean="0"/>
+              <a:t> to deploy</a:t>
+            </a:r>
+          </a:p>
+          <a:p>
+            <a:r>
+              <a:rPr lang="en-US" dirty="0" smtClean="0"/>
+              <a:t>The </a:t>
+            </a:r>
+            <a:r>
+              <a:rPr lang="en-US" dirty="0" smtClean="0"/>
+              <a:t>default API is a moving target</a:t>
             </a:r>
           </a:p>
           <a:p>
@@ -5516,7 +5567,7 @@
           <p:nvPr/>
         </p:nvPicPr>
         <p:blipFill>
-          <a:blip r:embed="rId3">
+          <a:blip r:embed="rId4">
             <a:extLst>
               <a:ext uri="{28A0092B-C50C-407E-A947-70E740481C1C}">
                 <a14:useLocalDpi xmlns:a14="http://schemas.microsoft.com/office/drawing/2010/main" val="0"/>
@@ -5580,7 +5631,7 @@
           <p:nvPr/>
         </p:nvPicPr>
         <p:blipFill>
-          <a:blip r:embed="rId4">
+          <a:blip r:embed="rId5">
             <a:extLst>
               <a:ext uri="{28A0092B-C50C-407E-A947-70E740481C1C}">
                 <a14:useLocalDpi xmlns:a14="http://schemas.microsoft.com/office/drawing/2010/main" val="0"/>
@@ -5644,7 +5695,7 @@
           <p:nvPr/>
         </p:nvPicPr>
         <p:blipFill>
-          <a:blip r:embed="rId5">
+          <a:blip r:embed="rId6">
             <a:clrChange>
               <a:clrFrom>
                 <a:srgbClr val="99B3CC"/>

</xml_diff>